<commit_message>
changed structure of the presentation
</commit_message>
<xml_diff>
--- a/Mini-Project Presentation/mini-presentation.pptx
+++ b/Mini-Project Presentation/mini-presentation.pptx
@@ -2,12 +2,12 @@
 <file path=ppt/presentation.xml><?xml version="1.0" encoding="utf-8"?>
 <p:presentation xmlns:a="http://schemas.openxmlformats.org/drawingml/2006/main" xmlns:r="http://schemas.openxmlformats.org/officeDocument/2006/relationships" xmlns:p="http://schemas.openxmlformats.org/presentationml/2006/main" xmlns:p14="http://schemas.microsoft.com/office/powerpoint/2010/main" showSpecialPlsOnTitleSld="0" saveSubsetFonts="1" autoCompressPictures="0">
   <p:sldMasterIdLst>
-    <p:sldMasterId id="2147483921" r:id="rId15"/>
-    <p:sldMasterId id="2147483922" r:id="rId17"/>
-    <p:sldMasterId id="2147483923" r:id="rId19"/>
-    <p:sldMasterId id="2147483924" r:id="rId21"/>
-    <p:sldMasterId id="2147483925" r:id="rId23"/>
-    <p:sldMasterId id="2147483926" r:id="rId25"/>
+    <p:sldMasterId id="2147483927" r:id="rId15"/>
+    <p:sldMasterId id="2147483928" r:id="rId17"/>
+    <p:sldMasterId id="2147483929" r:id="rId19"/>
+    <p:sldMasterId id="2147483930" r:id="rId21"/>
+    <p:sldMasterId id="2147483931" r:id="rId23"/>
+    <p:sldMasterId id="2147483932" r:id="rId25"/>
   </p:sldMasterIdLst>
   <p:notesMasterIdLst>
     <p:notesMasterId r:id="rId29"/>
@@ -18,9 +18,9 @@
   <p:sldIdLst>
     <p:sldId id="355" r:id="rId31"/>
     <p:sldId id="399" r:id="rId33"/>
-    <p:sldId id="400" r:id="rId34"/>
-    <p:sldId id="403" r:id="rId35"/>
-    <p:sldId id="406" r:id="rId36"/>
+    <p:sldId id="406" r:id="rId34"/>
+    <p:sldId id="400" r:id="rId35"/>
+    <p:sldId id="403" r:id="rId36"/>
     <p:sldId id="408" r:id="rId37"/>
     <p:sldId id="409" r:id="rId38"/>
   </p:sldIdLst>
@@ -168,17 +168,17 @@
     </p:ext>
     <p:ext uri="{EFAFB233-063F-42B5-8137-9DF3F51BA10A}">
       <p15:sldGuideLst xmlns:p15="http://schemas.microsoft.com/office/powerpoint/2012/main">
-        <p15:guide id="1" orient="horz" pos="2158" userDrawn="0">
+        <p15:guide id="1" orient="horz" pos="2157" userDrawn="0">
           <p15:clr>
             <a:srgbClr val="A4A3A4"/>
           </p15:clr>
         </p15:guide>
-        <p15:guide id="2" pos="2878" userDrawn="0">
+        <p15:guide id="2" pos="2877" userDrawn="0">
           <p15:clr>
             <a:srgbClr val="A4A3A4"/>
           </p15:clr>
         </p15:guide>
-        <p15:guide id="3" orient="horz" pos="1618" userDrawn="0">
+        <p15:guide id="3" orient="horz" pos="1617" userDrawn="0">
           <p15:clr>
             <a:srgbClr val="A4A3A4"/>
           </p15:clr>
@@ -7728,7 +7728,7 @@
 </file>
 
 <file path=ppt/slides/slide2.xml><?xml version="1.0" encoding="utf-8"?>
-<p:sld xmlns:a="http://schemas.openxmlformats.org/drawingml/2006/main" xmlns:r="http://schemas.openxmlformats.org/officeDocument/2006/relationships" xmlns:p="http://schemas.openxmlformats.org/presentationml/2006/main">
+<p:sld xmlns:a="http://schemas.openxmlformats.org/drawingml/2006/main" xmlns:r="http://schemas.openxmlformats.org/officeDocument/2006/relationships" xmlns:p="http://schemas.openxmlformats.org/presentationml/2006/main" xmlns:p14="http://schemas.microsoft.com/office/powerpoint/2010/main">
   <p:cSld>
     <p:spTree>
       <p:nvGrpSpPr>
@@ -7899,9 +7899,9 @@
           <p:nvPr/>
         </p:nvSpPr>
         <p:spPr>
-          <a:xfrm rot="0">
+          <a:xfrm>
             <a:off x="340995" y="2378075"/>
-            <a:ext cx="8490585" cy="1325245"/>
+            <a:ext cx="8491220" cy="832485"/>
           </a:xfrm>
           <a:prstGeom prst="rect"/>
           <a:noFill/>
@@ -7911,12 +7911,12 @@
           </a:ln>
         </p:spPr>
         <p:txBody>
-          <a:bodyPr wrap="square" lIns="89535" tIns="46355" rIns="89535" bIns="46355" vert="horz" anchor="t">
+          <a:bodyPr wrap="square" lIns="89535" tIns="46355" rIns="89535" bIns="46355" numCol="1" vert="horz" anchor="t">
             <a:spAutoFit/>
           </a:bodyPr>
           <a:lstStyle/>
           <a:p>
-            <a:pPr marL="254000" indent="-254000" algn="l" hangingPunct="1">
+            <a:pPr marL="254000" indent="-254000" algn="l" latinLnBrk="0" hangingPunct="1">
               <a:buFont typeface="Wingdings"/>
               <a:buChar char="Ø"/>
             </a:pPr>
@@ -7935,7 +7935,7 @@
             </a:endParaRPr>
           </a:p>
           <a:p>
-            <a:pPr marL="254000" indent="-254000" algn="l" hangingPunct="1">
+            <a:pPr marL="254000" indent="-254000" algn="l" latinLnBrk="0" hangingPunct="1">
               <a:buFont typeface="Wingdings"/>
               <a:buChar char="Ø"/>
             </a:pPr>
@@ -7954,7 +7954,7 @@
             </a:endParaRPr>
           </a:p>
           <a:p>
-            <a:pPr marL="254000" indent="-254000" algn="l" hangingPunct="1">
+            <a:pPr marL="254000" indent="-254000" algn="l" latinLnBrk="0" hangingPunct="1">
               <a:buFont typeface="Wingdings"/>
               <a:buChar char="Ø"/>
             </a:pPr>
@@ -7972,53 +7972,206 @@
               <a:cs typeface="Arial" charset="0"/>
             </a:endParaRPr>
           </a:p>
-          <a:p>
-            <a:pPr marL="254000" indent="-254000" algn="l" hangingPunct="1">
-              <a:buFont typeface="Wingdings"/>
-              <a:buChar char="Ø"/>
-            </a:pPr>
-            <a:r>
-              <a:rPr sz="1600">
-                <a:latin typeface="Arial" charset="0"/>
-                <a:ea typeface="Arial" charset="0"/>
-                <a:cs typeface="Arial" charset="0"/>
-              </a:rPr>
-              <a:t>Evaluation</a:t>
-            </a:r>
-            <a:endParaRPr lang="ko-KR" altLang="en-US" sz="1600">
-              <a:latin typeface="Arial" charset="0"/>
-              <a:ea typeface="Arial" charset="0"/>
-              <a:cs typeface="Arial" charset="0"/>
-            </a:endParaRPr>
-          </a:p>
-          <a:p>
-            <a:pPr marL="254000" indent="-254000" algn="l" hangingPunct="1">
-              <a:buFont typeface="Wingdings"/>
-              <a:buChar char="Ø"/>
-            </a:pPr>
-            <a:r>
-              <a:rPr sz="1600">
-                <a:latin typeface="Arial" charset="0"/>
-                <a:ea typeface="Arial" charset="0"/>
-                <a:cs typeface="Arial" charset="0"/>
-              </a:rPr>
-              <a:t>Conclusion and </a:t>
-            </a:r>
-            <a:r>
-              <a:rPr sz="1600">
-                <a:latin typeface="Arial" charset="0"/>
-                <a:ea typeface="Arial" charset="0"/>
-                <a:cs typeface="Arial" charset="0"/>
-              </a:rPr>
-              <a:t>Next Steps</a:t>
-            </a:r>
-            <a:endParaRPr lang="ko-KR" altLang="en-US" sz="1600">
-              <a:latin typeface="Arial" charset="0"/>
-              <a:ea typeface="Arial" charset="0"/>
-            </a:endParaRPr>
-          </a:p>
         </p:txBody>
       </p:sp>
+    </p:spTree>
+  </p:cSld>
+  <p:clrMapOvr>
+    <a:masterClrMapping/>
+  </p:clrMapOvr>
+  <mc:AlternateContent xmlns:mc="http://schemas.openxmlformats.org/markup-compatibility/2006">
+    <mc:Choice xmlns:p14="http://schemas.microsoft.com/office/powerpoint/2010/main" Requires="p14">
+      <p:transition spd="slow" p14:dur="2000"/>
+    </mc:Choice>
+    <mc:Fallback>
+      <p:transition spd="slow"/>
+    </mc:Fallback>
+  </mc:AlternateContent>
+  <p:timing>
+    <p:tnLst>
+      <p:par>
+        <p:cTn id="1" dur="indefinite" restart="never" nodeType="tmRoot"/>
+      </p:par>
+    </p:tnLst>
+  </p:timing>
+</p:sld>
+</file>
+
+<file path=ppt/slides/slide3.xml><?xml version="1.0" encoding="utf-8"?>
+<p:sld xmlns:a="http://schemas.openxmlformats.org/drawingml/2006/main" xmlns:r="http://schemas.openxmlformats.org/officeDocument/2006/relationships" xmlns:p="http://schemas.openxmlformats.org/presentationml/2006/main">
+  <p:cSld>
+    <p:spTree>
+      <p:nvGrpSpPr>
+        <p:cNvPr id="1" name=""/>
+        <p:cNvGrpSpPr/>
+        <p:nvPr/>
+      </p:nvGrpSpPr>
+      <p:grpSpPr>
+        <a:xfrm>
+          <a:off x="0" y="0"/>
+          <a:ext cx="0" cy="0"/>
+          <a:chOff x="0" y="0"/>
+          <a:chExt cx="0" cy="0"/>
+        </a:xfrm>
+      </p:grpSpPr>
+      <p:sp useBgFill="1">
+        <p:nvSpPr>
+          <p:cNvPr id="4" name="Textplatzhalter 7"/>
+          <p:cNvSpPr txBox="1">
+            <a:spLocks/>
+          </p:cNvSpPr>
+          <p:nvPr>
+            <p:ph type="body" idx="13" hasCustomPrompt="1"/>
+          </p:nvPr>
+        </p:nvSpPr>
+        <p:spPr>
+          <a:xfrm rot="0">
+            <a:off x="319405" y="1600200"/>
+            <a:ext cx="8509635" cy="506095"/>
+          </a:xfrm>
+          <a:prstGeom prst="rect"/>
+          <a:ln w="0">
+            <a:noFill/>
+            <a:prstDash/>
+          </a:ln>
+        </p:spPr>
+        <p:txBody>
+          <a:bodyPr wrap="square" lIns="0" tIns="0" rIns="0" bIns="0" numCol="1" vert="horz" anchor="t">
+            <a:noAutofit/>
+          </a:bodyPr>
+          <a:lstStyle>
+            <a:lvl1pPr marL="0" indent="0" latinLnBrk="0">
+              <a:lnSpc>
+                <a:spcPct val="114000"/>
+              </a:lnSpc>
+              <a:buFontTx/>
+              <a:buNone/>
+              <a:defRPr lang="en-GB" altLang="en-US" sz="1400"/>
+            </a:lvl1pPr>
+          </a:lstStyle>
+          <a:p>
+            <a:pPr marL="0" indent="0" rtl="0"/>
+            <a:r>
+              <a:rPr lang="de-DE" sz="1400">
+                <a:latin typeface="Arial" charset="0"/>
+                <a:ea typeface="Times New Roman" charset="0"/>
+                <a:cs typeface="+mn-cs"/>
+              </a:rPr>
+              <a:t>What</a:t>
+            </a:r>
+            <a:r>
+              <a:rPr lang="de-DE" sz="1400">
+                <a:latin typeface="Arial" charset="0"/>
+                <a:ea typeface="Times New Roman" charset="0"/>
+                <a:cs typeface="+mn-cs"/>
+              </a:rPr>
+              <a:t> are LLM’s and why are they important for us ?</a:t>
+            </a:r>
+            <a:endParaRPr lang="ko-KR" altLang="en-US" sz="1400">
+              <a:latin typeface="Arial" charset="0"/>
+              <a:ea typeface="Times New Roman" charset="0"/>
+              <a:cs typeface="+mn-cs"/>
+            </a:endParaRPr>
+          </a:p>
+        </p:txBody>
+      </p:sp>
+      <p:sp useBgFill="1">
+        <p:nvSpPr>
+          <p:cNvPr id="3" name="Titel 1"/>
+          <p:cNvSpPr txBox="1">
+            <a:spLocks/>
+          </p:cNvSpPr>
+          <p:nvPr>
+            <p:ph type="title" hasCustomPrompt="1"/>
+          </p:nvPr>
+        </p:nvSpPr>
+        <p:spPr>
+          <a:xfrm rot="0">
+            <a:off x="319405" y="972185"/>
+            <a:ext cx="8509635" cy="407035"/>
+          </a:xfrm>
+          <a:prstGeom prst="rect"/>
+          <a:ln w="0">
+            <a:noFill/>
+            <a:prstDash/>
+          </a:ln>
+        </p:spPr>
+        <p:txBody>
+          <a:bodyPr wrap="square" lIns="0" tIns="0" rIns="0" bIns="0" numCol="1" vert="horz" anchor="t">
+            <a:spAutoFit/>
+          </a:bodyPr>
+          <a:lstStyle>
+            <a:lvl1pPr marL="0" indent="0" latinLnBrk="0">
+              <a:lnSpc>
+                <a:spcPts val="3200"/>
+              </a:lnSpc>
+              <a:buFontTx/>
+              <a:buNone/>
+              <a:defRPr lang="en-GB" altLang="en-US" sz="2500"/>
+            </a:lvl1pPr>
+          </a:lstStyle>
+          <a:p>
+            <a:pPr marL="0" indent="0" rtl="0"/>
+            <a:r>
+              <a:rPr lang="de-DE" sz="2500" b="0">
+                <a:latin typeface="Arial" charset="0"/>
+                <a:ea typeface="Times New Roman" charset="0"/>
+                <a:cs typeface="+mj-cs"/>
+              </a:rPr>
+              <a:t>Introduction</a:t>
+            </a:r>
+            <a:r>
+              <a:rPr lang="de-DE" sz="2500" b="0">
+                <a:latin typeface="Arial" charset="0"/>
+                <a:ea typeface="Times New Roman" charset="0"/>
+                <a:cs typeface="+mj-cs"/>
+              </a:rPr>
+              <a:t> and Motivation</a:t>
+            </a:r>
+            <a:endParaRPr lang="ko-KR" altLang="en-US" sz="2500" b="0">
+              <a:latin typeface="Arial" charset="0"/>
+              <a:ea typeface="Times New Roman" charset="0"/>
+              <a:cs typeface="+mj-cs"/>
+            </a:endParaRPr>
+          </a:p>
+        </p:txBody>
+      </p:sp>
+      <p:pic>
+        <p:nvPicPr>
+          <p:cNvPr id="2" name="Inhaltsplatzhalter 2" descr="/Users/abraxas/Library/Group Containers/L48J367XN4.com.infraware.PolarisOffice/EngineTemp/46739/fImage160982356324.png"/>
+          <p:cNvPicPr>
+            <a:picLocks noChangeAspect="1"/>
+          </p:cNvPicPr>
+          <p:nvPr>
+            <p:ph type="obj" idx="1"/>
+          </p:nvPr>
+        </p:nvPicPr>
+        <p:blipFill rotWithShape="1">
+          <a:blip r:embed="rId2" cstate="print">
+            <a:extLst>
+              <a:ext uri="{28A0092B-C50C-407E-A947-70E740481C1C}">
+                <a14:useLocalDpi xmlns:a14="http://schemas.microsoft.com/office/drawing/2010/main" val="0"/>
+              </a:ext>
+            </a:extLst>
+          </a:blip>
+          <a:srcRect/>
+          <a:stretch>
+            <a:fillRect/>
+          </a:stretch>
+        </p:blipFill>
+        <p:spPr>
+          <a:xfrm rot="0">
+            <a:off x="1166495" y="1902460"/>
+            <a:ext cx="6220460" cy="3088640"/>
+          </a:xfrm>
+          <a:prstGeom prst="rect"/>
+          <a:noFill/>
+          <a:ln w="0">
+            <a:noFill/>
+            <a:prstDash/>
+          </a:ln>
+        </p:spPr>
+      </p:pic>
     </p:spTree>
   </p:cSld>
   <p:clrMapOvr>
@@ -8035,7 +8188,7 @@
 </p:sld>
 </file>
 
-<file path=ppt/slides/slide3.xml><?xml version="1.0" encoding="utf-8"?>
+<file path=ppt/slides/slide4.xml><?xml version="1.0" encoding="utf-8"?>
 <p:sld xmlns:a="http://schemas.openxmlformats.org/drawingml/2006/main" xmlns:r="http://schemas.openxmlformats.org/officeDocument/2006/relationships" xmlns:p="http://schemas.openxmlformats.org/presentationml/2006/main">
   <p:cSld>
     <p:spTree>
@@ -8225,247 +8378,6 @@
           <a:xfrm rot="0">
             <a:off x="1610995" y="2018665"/>
             <a:ext cx="5372735" cy="2863850"/>
-          </a:xfrm>
-          <a:prstGeom prst="rect"/>
-          <a:noFill/>
-          <a:ln w="0">
-            <a:noFill/>
-            <a:prstDash/>
-          </a:ln>
-        </p:spPr>
-      </p:pic>
-    </p:spTree>
-  </p:cSld>
-  <p:clrMapOvr>
-    <a:masterClrMapping/>
-  </p:clrMapOvr>
-  <mc:AlternateContent xmlns:mc="http://schemas.openxmlformats.org/markup-compatibility/2006">
-    <mc:Choice xmlns:p14="http://schemas.microsoft.com/office/powerpoint/2010/main" Requires="p14">
-      <p:transition spd="slow" p14:dur="2000"/>
-    </mc:Choice>
-    <mc:Fallback>
-      <p:transition spd="slow"/>
-    </mc:Fallback>
-  </mc:AlternateContent>
-</p:sld>
-</file>
-
-<file path=ppt/slides/slide4.xml><?xml version="1.0" encoding="utf-8"?>
-<p:sld xmlns:a="http://schemas.openxmlformats.org/drawingml/2006/main" xmlns:r="http://schemas.openxmlformats.org/officeDocument/2006/relationships" xmlns:p="http://schemas.openxmlformats.org/presentationml/2006/main">
-  <p:cSld>
-    <p:spTree>
-      <p:nvGrpSpPr>
-        <p:cNvPr id="1" name=""/>
-        <p:cNvGrpSpPr/>
-        <p:nvPr/>
-      </p:nvGrpSpPr>
-      <p:grpSpPr>
-        <a:xfrm>
-          <a:off x="0" y="0"/>
-          <a:ext cx="0" cy="0"/>
-          <a:chOff x="0" y="0"/>
-          <a:chExt cx="0" cy="0"/>
-        </a:xfrm>
-      </p:grpSpPr>
-      <p:sp useBgFill="1">
-        <p:nvSpPr>
-          <p:cNvPr id="4" name="Textplatzhalter 7"/>
-          <p:cNvSpPr txBox="1">
-            <a:spLocks/>
-          </p:cNvSpPr>
-          <p:nvPr>
-            <p:ph type="body" idx="13" hasCustomPrompt="1"/>
-          </p:nvPr>
-        </p:nvSpPr>
-        <p:spPr>
-          <a:xfrm rot="0">
-            <a:off x="319405" y="1600200"/>
-            <a:ext cx="8509635" cy="506095"/>
-          </a:xfrm>
-          <a:prstGeom prst="rect"/>
-          <a:ln w="0">
-            <a:noFill/>
-            <a:prstDash/>
-          </a:ln>
-        </p:spPr>
-        <p:txBody>
-          <a:bodyPr wrap="square" lIns="0" tIns="0" rIns="0" bIns="0" numCol="1" vert="horz" anchor="t">
-            <a:noAutofit/>
-          </a:bodyPr>
-          <a:lstStyle>
-            <a:lvl1pPr marL="0" indent="0" latinLnBrk="0">
-              <a:lnSpc>
-                <a:spcPct val="114000"/>
-              </a:lnSpc>
-              <a:buFontTx/>
-              <a:buNone/>
-              <a:defRPr lang="en-GB" altLang="en-US" sz="1400"/>
-            </a:lvl1pPr>
-          </a:lstStyle>
-          <a:p>
-            <a:pPr marL="0" indent="0" rtl="0" algn="l" fontAlgn="base" eaLnBrk="0" latinLnBrk="0" hangingPunct="0">
-              <a:lnSpc>
-                <a:spcPct val="114000"/>
-              </a:lnSpc>
-              <a:spcBef>
-                <a:spcPct val="0"/>
-              </a:spcBef>
-              <a:spcAft>
-                <a:spcPct val="0"/>
-              </a:spcAft>
-              <a:buFontTx/>
-              <a:buNone/>
-            </a:pPr>
-            <a:r>
-              <a:rPr lang="de-DE" sz="1400">
-                <a:solidFill>
-                  <a:schemeClr val="tx1"/>
-                </a:solidFill>
-                <a:latin typeface="Arial" charset="0"/>
-                <a:ea typeface="Times New Roman" charset="0"/>
-                <a:cs typeface="+mn-cs"/>
-              </a:rPr>
-              <a:t>What</a:t>
-            </a:r>
-            <a:r>
-              <a:rPr lang="de-DE" sz="1400">
-                <a:solidFill>
-                  <a:schemeClr val="tx1"/>
-                </a:solidFill>
-                <a:latin typeface="Arial" charset="0"/>
-                <a:ea typeface="Times New Roman" charset="0"/>
-                <a:cs typeface="+mn-cs"/>
-              </a:rPr>
-              <a:t> are LLM’s and why are they important for us ?</a:t>
-            </a:r>
-            <a:endParaRPr lang="ko-KR" altLang="en-US" sz="1400">
-              <a:solidFill>
-                <a:schemeClr val="tx1"/>
-              </a:solidFill>
-              <a:latin typeface="Arial" charset="0"/>
-              <a:ea typeface="Times New Roman" charset="0"/>
-              <a:cs typeface="+mn-cs"/>
-            </a:endParaRPr>
-          </a:p>
-          <a:p>
-            <a:pPr marL="0" indent="0" rtl="0"/>
-            <a:endParaRPr lang="ko-KR" altLang="en-US" sz="1400">
-              <a:latin typeface="Arial" charset="0"/>
-              <a:ea typeface="Times New Roman" charset="0"/>
-              <a:cs typeface="+mn-cs"/>
-            </a:endParaRPr>
-          </a:p>
-        </p:txBody>
-      </p:sp>
-      <p:sp useBgFill="1">
-        <p:nvSpPr>
-          <p:cNvPr id="3" name="Titel 1"/>
-          <p:cNvSpPr txBox="1">
-            <a:spLocks/>
-          </p:cNvSpPr>
-          <p:nvPr>
-            <p:ph type="title" hasCustomPrompt="1"/>
-          </p:nvPr>
-        </p:nvSpPr>
-        <p:spPr>
-          <a:xfrm rot="0">
-            <a:off x="332105" y="981075"/>
-            <a:ext cx="8496935" cy="407035"/>
-          </a:xfrm>
-          <a:prstGeom prst="rect"/>
-          <a:ln w="0">
-            <a:noFill/>
-            <a:prstDash/>
-          </a:ln>
-        </p:spPr>
-        <p:txBody>
-          <a:bodyPr wrap="square" lIns="0" tIns="0" rIns="0" bIns="0" numCol="1" vert="horz" anchor="t">
-            <a:spAutoFit/>
-          </a:bodyPr>
-          <a:lstStyle>
-            <a:lvl1pPr marL="0" indent="0" latinLnBrk="0">
-              <a:lnSpc>
-                <a:spcPts val="3200"/>
-              </a:lnSpc>
-              <a:buFontTx/>
-              <a:buNone/>
-              <a:defRPr lang="en-GB" altLang="en-US" sz="2500"/>
-            </a:lvl1pPr>
-          </a:lstStyle>
-          <a:p>
-            <a:pPr marL="0" indent="0" rtl="0" algn="l" fontAlgn="base" eaLnBrk="0" latinLnBrk="0" hangingPunct="0">
-              <a:lnSpc>
-                <a:spcPts val="3200"/>
-              </a:lnSpc>
-              <a:spcBef>
-                <a:spcPct val="0"/>
-              </a:spcBef>
-              <a:spcAft>
-                <a:spcPct val="0"/>
-              </a:spcAft>
-              <a:buFontTx/>
-              <a:buNone/>
-            </a:pPr>
-            <a:r>
-              <a:rPr lang="de-DE" sz="2500" b="0">
-                <a:solidFill>
-                  <a:schemeClr val="tx1"/>
-                </a:solidFill>
-                <a:latin typeface="Arial" charset="0"/>
-                <a:ea typeface="Times New Roman" charset="0"/>
-                <a:cs typeface="+mj-cs"/>
-              </a:rPr>
-              <a:t>Introduction</a:t>
-            </a:r>
-            <a:r>
-              <a:rPr lang="de-DE" sz="2500" b="0">
-                <a:solidFill>
-                  <a:schemeClr val="tx1"/>
-                </a:solidFill>
-                <a:latin typeface="Arial" charset="0"/>
-                <a:ea typeface="Times New Roman" charset="0"/>
-                <a:cs typeface="+mj-cs"/>
-              </a:rPr>
-              <a:t> and Motivation</a:t>
-            </a:r>
-            <a:endParaRPr lang="ko-KR" altLang="en-US" sz="2500" b="0">
-              <a:solidFill>
-                <a:schemeClr val="tx1"/>
-              </a:solidFill>
-              <a:latin typeface="Arial" charset="0"/>
-              <a:ea typeface="Times New Roman" charset="0"/>
-              <a:cs typeface="+mj-cs"/>
-            </a:endParaRPr>
-          </a:p>
-        </p:txBody>
-      </p:sp>
-      <p:pic>
-        <p:nvPicPr>
-          <p:cNvPr id="2" name="Inhaltsplatzhalter 2" descr="/Users/abraxas/Library/Group Containers/L48J367XN4.com.infraware.PolarisOffice/EngineTemp/46739/fImage2211063404877.png"/>
-          <p:cNvPicPr>
-            <a:picLocks noChangeAspect="1"/>
-          </p:cNvPicPr>
-          <p:nvPr>
-            <p:ph type="obj" idx="1"/>
-          </p:nvPr>
-        </p:nvPicPr>
-        <p:blipFill rotWithShape="1">
-          <a:blip r:embed="rId2" cstate="print">
-            <a:extLst>
-              <a:ext uri="{28A0092B-C50C-407E-A947-70E740481C1C}">
-                <a14:useLocalDpi xmlns:a14="http://schemas.microsoft.com/office/drawing/2010/main" val="0"/>
-              </a:ext>
-            </a:extLst>
-          </a:blip>
-          <a:srcRect/>
-          <a:stretch>
-            <a:fillRect/>
-          </a:stretch>
-        </p:blipFill>
-        <p:spPr>
-          <a:xfrm rot="0">
-            <a:off x="1871345" y="2106930"/>
-            <a:ext cx="4752975" cy="2874645"/>
           </a:xfrm>
           <a:prstGeom prst="rect"/>
           <a:noFill/>
@@ -8544,9 +8456,24 @@
             </a:lvl1pPr>
           </a:lstStyle>
           <a:p>
-            <a:pPr marL="0" indent="0" rtl="0"/>
+            <a:pPr marL="0" indent="0" rtl="0" algn="l" fontAlgn="base" eaLnBrk="0" latinLnBrk="0" hangingPunct="0">
+              <a:lnSpc>
+                <a:spcPct val="114000"/>
+              </a:lnSpc>
+              <a:spcBef>
+                <a:spcPct val="0"/>
+              </a:spcBef>
+              <a:spcAft>
+                <a:spcPct val="0"/>
+              </a:spcAft>
+              <a:buFontTx/>
+              <a:buNone/>
+            </a:pPr>
             <a:r>
               <a:rPr lang="de-DE" sz="1400">
+                <a:solidFill>
+                  <a:schemeClr val="tx1"/>
+                </a:solidFill>
                 <a:latin typeface="Arial" charset="0"/>
                 <a:ea typeface="Times New Roman" charset="0"/>
                 <a:cs typeface="+mn-cs"/>
@@ -8555,12 +8482,26 @@
             </a:r>
             <a:r>
               <a:rPr lang="de-DE" sz="1400">
+                <a:solidFill>
+                  <a:schemeClr val="tx1"/>
+                </a:solidFill>
                 <a:latin typeface="Arial" charset="0"/>
                 <a:ea typeface="Times New Roman" charset="0"/>
                 <a:cs typeface="+mn-cs"/>
               </a:rPr>
               <a:t> are LLM’s and why are they important for us ?</a:t>
             </a:r>
+            <a:endParaRPr lang="ko-KR" altLang="en-US" sz="1400">
+              <a:solidFill>
+                <a:schemeClr val="tx1"/>
+              </a:solidFill>
+              <a:latin typeface="Arial" charset="0"/>
+              <a:ea typeface="Times New Roman" charset="0"/>
+              <a:cs typeface="+mn-cs"/>
+            </a:endParaRPr>
+          </a:p>
+          <a:p>
+            <a:pPr marL="0" indent="0" rtl="0"/>
             <a:endParaRPr lang="ko-KR" altLang="en-US" sz="1400">
               <a:latin typeface="Arial" charset="0"/>
               <a:ea typeface="Times New Roman" charset="0"/>
@@ -8581,8 +8522,8 @@
         </p:nvSpPr>
         <p:spPr>
           <a:xfrm rot="0">
-            <a:off x="319405" y="972185"/>
-            <a:ext cx="8509635" cy="407035"/>
+            <a:off x="332105" y="981075"/>
+            <a:ext cx="8496935" cy="407035"/>
           </a:xfrm>
           <a:prstGeom prst="rect"/>
           <a:ln w="0">
@@ -8605,9 +8546,24 @@
             </a:lvl1pPr>
           </a:lstStyle>
           <a:p>
-            <a:pPr marL="0" indent="0" rtl="0"/>
+            <a:pPr marL="0" indent="0" rtl="0" algn="l" fontAlgn="base" eaLnBrk="0" latinLnBrk="0" hangingPunct="0">
+              <a:lnSpc>
+                <a:spcPts val="3200"/>
+              </a:lnSpc>
+              <a:spcBef>
+                <a:spcPct val="0"/>
+              </a:spcBef>
+              <a:spcAft>
+                <a:spcPct val="0"/>
+              </a:spcAft>
+              <a:buFontTx/>
+              <a:buNone/>
+            </a:pPr>
             <a:r>
               <a:rPr lang="de-DE" sz="2500" b="0">
+                <a:solidFill>
+                  <a:schemeClr val="tx1"/>
+                </a:solidFill>
                 <a:latin typeface="Arial" charset="0"/>
                 <a:ea typeface="Times New Roman" charset="0"/>
                 <a:cs typeface="+mj-cs"/>
@@ -8616,6 +8572,9 @@
             </a:r>
             <a:r>
               <a:rPr lang="de-DE" sz="2500" b="0">
+                <a:solidFill>
+                  <a:schemeClr val="tx1"/>
+                </a:solidFill>
                 <a:latin typeface="Arial" charset="0"/>
                 <a:ea typeface="Times New Roman" charset="0"/>
                 <a:cs typeface="+mj-cs"/>
@@ -8623,6 +8582,9 @@
               <a:t> and Motivation</a:t>
             </a:r>
             <a:endParaRPr lang="ko-KR" altLang="en-US" sz="2500" b="0">
+              <a:solidFill>
+                <a:schemeClr val="tx1"/>
+              </a:solidFill>
               <a:latin typeface="Arial" charset="0"/>
               <a:ea typeface="Times New Roman" charset="0"/>
               <a:cs typeface="+mj-cs"/>
@@ -8632,7 +8594,7 @@
       </p:sp>
       <p:pic>
         <p:nvPicPr>
-          <p:cNvPr id="2" name="Inhaltsplatzhalter 2" descr="/Users/abraxas/Library/Group Containers/L48J367XN4.com.infraware.PolarisOffice/EngineTemp/46739/fImage160982356324.png"/>
+          <p:cNvPr id="2" name="Inhaltsplatzhalter 2" descr="/Users/abraxas/Library/Group Containers/L48J367XN4.com.infraware.PolarisOffice/EngineTemp/46739/fImage2211063404877.png"/>
           <p:cNvPicPr>
             <a:picLocks noChangeAspect="1"/>
           </p:cNvPicPr>
@@ -8655,8 +8617,8 @@
         </p:blipFill>
         <p:spPr>
           <a:xfrm rot="0">
-            <a:off x="1166495" y="1902460"/>
-            <a:ext cx="6220460" cy="3088640"/>
+            <a:off x="1871345" y="2106930"/>
+            <a:ext cx="4752975" cy="2874645"/>
           </a:xfrm>
           <a:prstGeom prst="rect"/>
           <a:noFill/>

</xml_diff>